<commit_message>
Update after the homework
</commit_message>
<xml_diff>
--- a/5.Controller/RestApi.pptx
+++ b/5.Controller/RestApi.pptx
@@ -30520,24 +30520,12 @@
                 <a:solidFill>
                   <a:schemeClr val="tx1"/>
                 </a:solidFill>
-                <a:latin typeface="Calibri"/>
-                <a:ea typeface="Roboto"/>
-                <a:cs typeface="Calibri"/>
-                <a:sym typeface="Calibri"/>
-              </a:rPr>
-              <a:t> </a:t>
-            </a:r>
-            <a:r>
-              <a:rPr lang="ru-RU" sz="2000" dirty="0">
-                <a:solidFill>
-                  <a:schemeClr val="tx1"/>
-                </a:solidFill>
                 <a:latin typeface="Roboto"/>
                 <a:ea typeface="Roboto"/>
                 <a:cs typeface="Calibri"/>
                 <a:sym typeface="Calibri"/>
               </a:rPr>
-              <a:t>Принцип единого интерфейса устанавливает интерфейс взаимодействия между клиентом и сервером.</a:t>
+              <a:t> Устанавливает интерфейс взаимодействия между клиентом и сервером.</a:t>
             </a:r>
             <a:endParaRPr lang="ru-RU" sz="2000" dirty="0">
               <a:latin typeface="Roboto"/>

</xml_diff>